<commit_message>
Ostatnie zmiany, ostatnia prezentacja
</commit_message>
<xml_diff>
--- a/prezentacja JPWP.pptx
+++ b/prezentacja JPWP.pptx
@@ -14,17 +14,18 @@
     <p:sldId id="271" r:id="rId8"/>
     <p:sldId id="272" r:id="rId9"/>
     <p:sldId id="273" r:id="rId10"/>
-    <p:sldId id="260" r:id="rId11"/>
-    <p:sldId id="261" r:id="rId12"/>
-    <p:sldId id="262" r:id="rId13"/>
-    <p:sldId id="263" r:id="rId14"/>
-    <p:sldId id="264" r:id="rId15"/>
-    <p:sldId id="265" r:id="rId16"/>
-    <p:sldId id="266" r:id="rId17"/>
-    <p:sldId id="267" r:id="rId18"/>
-    <p:sldId id="274" r:id="rId19"/>
-    <p:sldId id="275" r:id="rId20"/>
-    <p:sldId id="268" r:id="rId21"/>
+    <p:sldId id="276" r:id="rId11"/>
+    <p:sldId id="260" r:id="rId12"/>
+    <p:sldId id="261" r:id="rId13"/>
+    <p:sldId id="262" r:id="rId14"/>
+    <p:sldId id="263" r:id="rId15"/>
+    <p:sldId id="264" r:id="rId16"/>
+    <p:sldId id="265" r:id="rId17"/>
+    <p:sldId id="266" r:id="rId18"/>
+    <p:sldId id="267" r:id="rId19"/>
+    <p:sldId id="274" r:id="rId20"/>
+    <p:sldId id="275" r:id="rId21"/>
+    <p:sldId id="268" r:id="rId22"/>
   </p:sldIdLst>
   <p:sldSz cx="12192000" cy="6858000"/>
   <p:notesSz cx="6858000" cy="9144000"/>
@@ -888,7 +889,7 @@
           <a:p>
             <a:fld id="{CB0BB233-4789-43D5-B335-B775941096F3}" type="datetimeFigureOut">
               <a:rPr lang="pl-PL" smtClean="0"/>
-              <a:t>12.05.2025</a:t>
+              <a:t>13.05.2025</a:t>
             </a:fld>
             <a:endParaRPr lang="pl-PL"/>
           </a:p>
@@ -1139,7 +1140,7 @@
           <a:p>
             <a:fld id="{CB0BB233-4789-43D5-B335-B775941096F3}" type="datetimeFigureOut">
               <a:rPr lang="pl-PL" smtClean="0"/>
-              <a:t>12.05.2025</a:t>
+              <a:t>13.05.2025</a:t>
             </a:fld>
             <a:endParaRPr lang="pl-PL"/>
           </a:p>
@@ -1453,7 +1454,7 @@
           <a:p>
             <a:fld id="{CB0BB233-4789-43D5-B335-B775941096F3}" type="datetimeFigureOut">
               <a:rPr lang="pl-PL" smtClean="0"/>
-              <a:t>12.05.2025</a:t>
+              <a:t>13.05.2025</a:t>
             </a:fld>
             <a:endParaRPr lang="pl-PL"/>
           </a:p>
@@ -1786,7 +1787,7 @@
           <a:p>
             <a:fld id="{CB0BB233-4789-43D5-B335-B775941096F3}" type="datetimeFigureOut">
               <a:rPr lang="pl-PL" smtClean="0"/>
-              <a:t>12.05.2025</a:t>
+              <a:t>13.05.2025</a:t>
             </a:fld>
             <a:endParaRPr lang="pl-PL"/>
           </a:p>
@@ -2100,7 +2101,7 @@
           <a:p>
             <a:fld id="{CB0BB233-4789-43D5-B335-B775941096F3}" type="datetimeFigureOut">
               <a:rPr lang="pl-PL" smtClean="0"/>
-              <a:t>12.05.2025</a:t>
+              <a:t>13.05.2025</a:t>
             </a:fld>
             <a:endParaRPr lang="pl-PL"/>
           </a:p>
@@ -2493,7 +2494,7 @@
           <a:p>
             <a:fld id="{CB0BB233-4789-43D5-B335-B775941096F3}" type="datetimeFigureOut">
               <a:rPr lang="pl-PL" smtClean="0"/>
-              <a:t>12.05.2025</a:t>
+              <a:t>13.05.2025</a:t>
             </a:fld>
             <a:endParaRPr lang="pl-PL"/>
           </a:p>
@@ -2663,7 +2664,7 @@
           <a:p>
             <a:fld id="{CB0BB233-4789-43D5-B335-B775941096F3}" type="datetimeFigureOut">
               <a:rPr lang="pl-PL" smtClean="0"/>
-              <a:t>12.05.2025</a:t>
+              <a:t>13.05.2025</a:t>
             </a:fld>
             <a:endParaRPr lang="pl-PL"/>
           </a:p>
@@ -2843,7 +2844,7 @@
           <a:p>
             <a:fld id="{CB0BB233-4789-43D5-B335-B775941096F3}" type="datetimeFigureOut">
               <a:rPr lang="pl-PL" smtClean="0"/>
-              <a:t>12.05.2025</a:t>
+              <a:t>13.05.2025</a:t>
             </a:fld>
             <a:endParaRPr lang="pl-PL"/>
           </a:p>
@@ -3013,7 +3014,7 @@
           <a:p>
             <a:fld id="{CB0BB233-4789-43D5-B335-B775941096F3}" type="datetimeFigureOut">
               <a:rPr lang="pl-PL" smtClean="0"/>
-              <a:t>12.05.2025</a:t>
+              <a:t>13.05.2025</a:t>
             </a:fld>
             <a:endParaRPr lang="pl-PL"/>
           </a:p>
@@ -3260,7 +3261,7 @@
           <a:p>
             <a:fld id="{CB0BB233-4789-43D5-B335-B775941096F3}" type="datetimeFigureOut">
               <a:rPr lang="pl-PL" smtClean="0"/>
-              <a:t>12.05.2025</a:t>
+              <a:t>13.05.2025</a:t>
             </a:fld>
             <a:endParaRPr lang="pl-PL"/>
           </a:p>
@@ -3492,7 +3493,7 @@
           <a:p>
             <a:fld id="{CB0BB233-4789-43D5-B335-B775941096F3}" type="datetimeFigureOut">
               <a:rPr lang="pl-PL" smtClean="0"/>
-              <a:t>12.05.2025</a:t>
+              <a:t>13.05.2025</a:t>
             </a:fld>
             <a:endParaRPr lang="pl-PL"/>
           </a:p>
@@ -3866,7 +3867,7 @@
           <a:p>
             <a:fld id="{CB0BB233-4789-43D5-B335-B775941096F3}" type="datetimeFigureOut">
               <a:rPr lang="pl-PL" smtClean="0"/>
-              <a:t>12.05.2025</a:t>
+              <a:t>13.05.2025</a:t>
             </a:fld>
             <a:endParaRPr lang="pl-PL"/>
           </a:p>
@@ -3989,7 +3990,7 @@
           <a:p>
             <a:fld id="{CB0BB233-4789-43D5-B335-B775941096F3}" type="datetimeFigureOut">
               <a:rPr lang="pl-PL" smtClean="0"/>
-              <a:t>12.05.2025</a:t>
+              <a:t>13.05.2025</a:t>
             </a:fld>
             <a:endParaRPr lang="pl-PL"/>
           </a:p>
@@ -4084,7 +4085,7 @@
           <a:p>
             <a:fld id="{CB0BB233-4789-43D5-B335-B775941096F3}" type="datetimeFigureOut">
               <a:rPr lang="pl-PL" smtClean="0"/>
-              <a:t>12.05.2025</a:t>
+              <a:t>13.05.2025</a:t>
             </a:fld>
             <a:endParaRPr lang="pl-PL"/>
           </a:p>
@@ -4339,7 +4340,7 @@
           <a:p>
             <a:fld id="{CB0BB233-4789-43D5-B335-B775941096F3}" type="datetimeFigureOut">
               <a:rPr lang="pl-PL" smtClean="0"/>
-              <a:t>12.05.2025</a:t>
+              <a:t>13.05.2025</a:t>
             </a:fld>
             <a:endParaRPr lang="pl-PL"/>
           </a:p>
@@ -4644,7 +4645,7 @@
           <a:p>
             <a:fld id="{CB0BB233-4789-43D5-B335-B775941096F3}" type="datetimeFigureOut">
               <a:rPr lang="pl-PL" smtClean="0"/>
-              <a:t>12.05.2025</a:t>
+              <a:t>13.05.2025</a:t>
             </a:fld>
             <a:endParaRPr lang="pl-PL"/>
           </a:p>
@@ -5346,7 +5347,7 @@
           <a:p>
             <a:fld id="{CB0BB233-4789-43D5-B335-B775941096F3}" type="datetimeFigureOut">
               <a:rPr lang="pl-PL" smtClean="0"/>
-              <a:t>12.05.2025</a:t>
+              <a:t>13.05.2025</a:t>
             </a:fld>
             <a:endParaRPr lang="pl-PL"/>
           </a:p>
@@ -5992,6 +5993,113 @@
           <a:p>
             <a:r>
               <a:rPr lang="pl-PL" sz="4000" b="1" dirty="0"/>
+              <a:t>Kopiec</a:t>
+            </a:r>
+          </a:p>
+        </p:txBody>
+      </p:sp>
+      <p:sp>
+        <p:nvSpPr>
+          <p:cNvPr id="3" name="Symbol zastępczy zawartości 2">
+            <a:extLst>
+              <a:ext uri="{FF2B5EF4-FFF2-40B4-BE49-F238E27FC236}">
+                <a16:creationId xmlns:a16="http://schemas.microsoft.com/office/drawing/2014/main" id="{98C77CCA-89B1-6115-6C54-550E88236321}"/>
+              </a:ext>
+            </a:extLst>
+          </p:cNvPr>
+          <p:cNvSpPr>
+            <a:spLocks noGrp="1"/>
+          </p:cNvSpPr>
+          <p:nvPr>
+            <p:ph idx="1"/>
+          </p:nvPr>
+        </p:nvSpPr>
+        <p:spPr/>
+        <p:txBody>
+          <a:bodyPr>
+            <a:normAutofit/>
+          </a:bodyPr>
+          <a:lstStyle/>
+          <a:p>
+            <a:r>
+              <a:rPr lang="pl-PL" sz="2400" dirty="0"/>
+              <a:t>Kopiec to struktura danych oparta na drzewie binarnym, która spełnia tzw. właściwość kopca</a:t>
+            </a:r>
+          </a:p>
+          <a:p>
+            <a:r>
+              <a:rPr lang="pl-PL" sz="2400" dirty="0"/>
+              <a:t>Często implementowany jako kompletne drzewo binarne, co pozwala na jego efektywne przechowywanie w tablicach</a:t>
+            </a:r>
+          </a:p>
+          <a:p>
+            <a:r>
+              <a:rPr lang="pl-PL" sz="2400" dirty="0"/>
+              <a:t>Operacje takie jak dodawanie nowego elementu czy usuwanie elementu o najwyższym (lub najniższym) priorytecie można wykonywać w czasie logarytmicznym</a:t>
+            </a:r>
+          </a:p>
+        </p:txBody>
+      </p:sp>
+    </p:spTree>
+    <p:extLst>
+      <p:ext uri="{BB962C8B-B14F-4D97-AF65-F5344CB8AC3E}">
+        <p14:creationId xmlns:p14="http://schemas.microsoft.com/office/powerpoint/2010/main" val="1457812108"/>
+      </p:ext>
+    </p:extLst>
+  </p:cSld>
+  <p:clrMapOvr>
+    <a:masterClrMapping/>
+  </p:clrMapOvr>
+</p:sld>
+</file>
+
+<file path=ppt/slides/slide11.xml><?xml version="1.0" encoding="utf-8"?>
+<p:sld xmlns:a="http://schemas.openxmlformats.org/drawingml/2006/main" xmlns:r="http://schemas.openxmlformats.org/officeDocument/2006/relationships" xmlns:p="http://schemas.openxmlformats.org/presentationml/2006/main">
+  <p:cSld>
+    <p:spTree>
+      <p:nvGrpSpPr>
+        <p:cNvPr id="1" name=""/>
+        <p:cNvGrpSpPr/>
+        <p:nvPr/>
+      </p:nvGrpSpPr>
+      <p:grpSpPr>
+        <a:xfrm>
+          <a:off x="0" y="0"/>
+          <a:ext cx="0" cy="0"/>
+          <a:chOff x="0" y="0"/>
+          <a:chExt cx="0" cy="0"/>
+        </a:xfrm>
+      </p:grpSpPr>
+      <p:sp>
+        <p:nvSpPr>
+          <p:cNvPr id="2" name="Tytuł 1">
+            <a:extLst>
+              <a:ext uri="{FF2B5EF4-FFF2-40B4-BE49-F238E27FC236}">
+                <a16:creationId xmlns:a16="http://schemas.microsoft.com/office/drawing/2014/main" id="{3E889BE8-699D-A620-C860-49F96460127F}"/>
+              </a:ext>
+            </a:extLst>
+          </p:cNvPr>
+          <p:cNvSpPr>
+            <a:spLocks noGrp="1"/>
+          </p:cNvSpPr>
+          <p:nvPr>
+            <p:ph type="title"/>
+          </p:nvPr>
+        </p:nvSpPr>
+        <p:spPr>
+          <a:xfrm>
+            <a:off x="677334" y="1089764"/>
+            <a:ext cx="8596668" cy="840636"/>
+          </a:xfrm>
+        </p:spPr>
+        <p:txBody>
+          <a:bodyPr>
+            <a:normAutofit/>
+          </a:bodyPr>
+          <a:lstStyle/>
+          <a:p>
+            <a:r>
+              <a:rPr lang="pl-PL" sz="4000" b="1" dirty="0"/>
               <a:t>Kolejki priorytetowe</a:t>
             </a:r>
           </a:p>
@@ -6052,7 +6160,7 @@
 </p:sld>
 </file>
 
-<file path=ppt/slides/slide11.xml><?xml version="1.0" encoding="utf-8"?>
+<file path=ppt/slides/slide12.xml><?xml version="1.0" encoding="utf-8"?>
 <p:sld xmlns:a="http://schemas.openxmlformats.org/drawingml/2006/main" xmlns:r="http://schemas.openxmlformats.org/officeDocument/2006/relationships" xmlns:p="http://schemas.openxmlformats.org/presentationml/2006/main">
   <p:cSld>
     <p:bg>
@@ -6246,7 +6354,7 @@
 </p:sld>
 </file>
 
-<file path=ppt/slides/slide12.xml><?xml version="1.0" encoding="utf-8"?>
+<file path=ppt/slides/slide13.xml><?xml version="1.0" encoding="utf-8"?>
 <p:sld xmlns:a="http://schemas.openxmlformats.org/drawingml/2006/main" xmlns:r="http://schemas.openxmlformats.org/officeDocument/2006/relationships" xmlns:p="http://schemas.openxmlformats.org/presentationml/2006/main">
   <p:cSld>
     <p:spTree>
@@ -6354,7 +6462,7 @@
 </p:sld>
 </file>
 
-<file path=ppt/slides/slide13.xml><?xml version="1.0" encoding="utf-8"?>
+<file path=ppt/slides/slide14.xml><?xml version="1.0" encoding="utf-8"?>
 <p:sld xmlns:a="http://schemas.openxmlformats.org/drawingml/2006/main" xmlns:r="http://schemas.openxmlformats.org/officeDocument/2006/relationships" xmlns:p="http://schemas.openxmlformats.org/presentationml/2006/main">
   <p:cSld>
     <p:spTree>
@@ -6517,7 +6625,7 @@
 </p:sld>
 </file>
 
-<file path=ppt/slides/slide14.xml><?xml version="1.0" encoding="utf-8"?>
+<file path=ppt/slides/slide15.xml><?xml version="1.0" encoding="utf-8"?>
 <p:sld xmlns:a="http://schemas.openxmlformats.org/drawingml/2006/main" xmlns:r="http://schemas.openxmlformats.org/officeDocument/2006/relationships" xmlns:p="http://schemas.openxmlformats.org/presentationml/2006/main">
   <p:cSld>
     <p:spTree>
@@ -6675,7 +6783,7 @@
 </p:sld>
 </file>
 
-<file path=ppt/slides/slide15.xml><?xml version="1.0" encoding="utf-8"?>
+<file path=ppt/slides/slide16.xml><?xml version="1.0" encoding="utf-8"?>
 <p:sld xmlns:a="http://schemas.openxmlformats.org/drawingml/2006/main" xmlns:r="http://schemas.openxmlformats.org/officeDocument/2006/relationships" xmlns:p="http://schemas.openxmlformats.org/presentationml/2006/main">
   <p:cSld>
     <p:spTree>
@@ -6837,114 +6945,6 @@
 </p:sld>
 </file>
 
-<file path=ppt/slides/slide16.xml><?xml version="1.0" encoding="utf-8"?>
-<p:sld xmlns:a="http://schemas.openxmlformats.org/drawingml/2006/main" xmlns:r="http://schemas.openxmlformats.org/officeDocument/2006/relationships" xmlns:p="http://schemas.openxmlformats.org/presentationml/2006/main">
-  <p:cSld>
-    <p:spTree>
-      <p:nvGrpSpPr>
-        <p:cNvPr id="1" name=""/>
-        <p:cNvGrpSpPr/>
-        <p:nvPr/>
-      </p:nvGrpSpPr>
-      <p:grpSpPr>
-        <a:xfrm>
-          <a:off x="0" y="0"/>
-          <a:ext cx="0" cy="0"/>
-          <a:chOff x="0" y="0"/>
-          <a:chExt cx="0" cy="0"/>
-        </a:xfrm>
-      </p:grpSpPr>
-      <p:sp>
-        <p:nvSpPr>
-          <p:cNvPr id="2" name="Tytuł 1">
-            <a:extLst>
-              <a:ext uri="{FF2B5EF4-FFF2-40B4-BE49-F238E27FC236}">
-                <a16:creationId xmlns:a16="http://schemas.microsoft.com/office/drawing/2014/main" id="{A79D4F85-C3F1-9E4C-5C75-EB22FA7EB81F}"/>
-              </a:ext>
-            </a:extLst>
-          </p:cNvPr>
-          <p:cNvSpPr>
-            <a:spLocks noGrp="1"/>
-          </p:cNvSpPr>
-          <p:nvPr>
-            <p:ph type="title"/>
-          </p:nvPr>
-        </p:nvSpPr>
-        <p:spPr/>
-        <p:txBody>
-          <a:bodyPr>
-            <a:normAutofit/>
-          </a:bodyPr>
-          <a:lstStyle/>
-          <a:p>
-            <a:r>
-              <a:rPr lang="pl-PL" sz="4000" b="1" dirty="0"/>
-              <a:t>Wykorzystanie kolejek priorytetowych</a:t>
-            </a:r>
-          </a:p>
-        </p:txBody>
-      </p:sp>
-      <p:sp>
-        <p:nvSpPr>
-          <p:cNvPr id="3" name="Symbol zastępczy zawartości 2">
-            <a:extLst>
-              <a:ext uri="{FF2B5EF4-FFF2-40B4-BE49-F238E27FC236}">
-                <a16:creationId xmlns:a16="http://schemas.microsoft.com/office/drawing/2014/main" id="{CC6D16DF-C101-CD3F-100B-CCCC6F7894C4}"/>
-              </a:ext>
-            </a:extLst>
-          </p:cNvPr>
-          <p:cNvSpPr>
-            <a:spLocks noGrp="1"/>
-          </p:cNvSpPr>
-          <p:nvPr>
-            <p:ph idx="1"/>
-          </p:nvPr>
-        </p:nvSpPr>
-        <p:spPr/>
-        <p:txBody>
-          <a:bodyPr>
-            <a:normAutofit/>
-          </a:bodyPr>
-          <a:lstStyle/>
-          <a:p>
-            <a:r>
-              <a:rPr lang="pl-PL" sz="2400" dirty="0"/>
-              <a:t>Wiele algorytmów grafowych m.in. Wyszukiwanie najkrótszej ścieżki w grafie </a:t>
-            </a:r>
-          </a:p>
-          <a:p>
-            <a:endParaRPr lang="pl-PL" sz="2400" dirty="0"/>
-          </a:p>
-          <a:p>
-            <a:r>
-              <a:rPr lang="pl-PL" sz="2400" dirty="0"/>
-              <a:t>Zarządzanie procesami, procesy o wyższym priorytecie wykonuje się pierwsze</a:t>
-            </a:r>
-          </a:p>
-          <a:p>
-            <a:endParaRPr lang="pl-PL" sz="2400" dirty="0"/>
-          </a:p>
-          <a:p>
-            <a:r>
-              <a:rPr lang="pl-PL" sz="2400" dirty="0"/>
-              <a:t>Kompresja danych i symulacja zdarzeń</a:t>
-            </a:r>
-          </a:p>
-        </p:txBody>
-      </p:sp>
-    </p:spTree>
-    <p:extLst>
-      <p:ext uri="{BB962C8B-B14F-4D97-AF65-F5344CB8AC3E}">
-        <p14:creationId xmlns:p14="http://schemas.microsoft.com/office/powerpoint/2010/main" val="3246297485"/>
-      </p:ext>
-    </p:extLst>
-  </p:cSld>
-  <p:clrMapOvr>
-    <a:masterClrMapping/>
-  </p:clrMapOvr>
-</p:sld>
-</file>
-
 <file path=ppt/slides/slide17.xml><?xml version="1.0" encoding="utf-8"?>
 <p:sld xmlns:a="http://schemas.openxmlformats.org/drawingml/2006/main" xmlns:r="http://schemas.openxmlformats.org/officeDocument/2006/relationships" xmlns:p="http://schemas.openxmlformats.org/presentationml/2006/main">
   <p:cSld>
@@ -6967,7 +6967,7 @@
           <p:cNvPr id="2" name="Tytuł 1">
             <a:extLst>
               <a:ext uri="{FF2B5EF4-FFF2-40B4-BE49-F238E27FC236}">
-                <a16:creationId xmlns:a16="http://schemas.microsoft.com/office/drawing/2014/main" id="{BE18F60B-220A-32BB-5E5D-08C322A470DF}"/>
+                <a16:creationId xmlns:a16="http://schemas.microsoft.com/office/drawing/2014/main" id="{A79D4F85-C3F1-9E4C-5C75-EB22FA7EB81F}"/>
               </a:ext>
             </a:extLst>
           </p:cNvPr>
@@ -6987,7 +6987,7 @@
           <a:p>
             <a:r>
               <a:rPr lang="pl-PL" sz="4000" b="1" dirty="0"/>
-              <a:t>Kolejki priorytetowe - podsumowanie</a:t>
+              <a:t>Wykorzystanie kolejek priorytetowych</a:t>
             </a:r>
           </a:p>
         </p:txBody>
@@ -6997,7 +6997,7 @@
           <p:cNvPr id="3" name="Symbol zastępczy zawartości 2">
             <a:extLst>
               <a:ext uri="{FF2B5EF4-FFF2-40B4-BE49-F238E27FC236}">
-                <a16:creationId xmlns:a16="http://schemas.microsoft.com/office/drawing/2014/main" id="{A204FEB9-833A-EAE1-4F61-7215940CEEDA}"/>
+                <a16:creationId xmlns:a16="http://schemas.microsoft.com/office/drawing/2014/main" id="{CC6D16DF-C101-CD3F-100B-CCCC6F7894C4}"/>
               </a:ext>
             </a:extLst>
           </p:cNvPr>
@@ -7016,63 +7016,26 @@
           <a:lstStyle/>
           <a:p>
             <a:r>
-              <a:rPr lang="pl-PL" sz="2000" dirty="0"/>
-              <a:t>Można szybko zaimplementować wykorzystując </a:t>
-            </a:r>
-            <a:r>
-              <a:rPr lang="pl-PL" sz="2000" dirty="0" err="1"/>
-              <a:t>heapq</a:t>
-            </a:r>
-            <a:r>
-              <a:rPr lang="pl-PL" sz="2000" dirty="0"/>
-              <a:t> w </a:t>
-            </a:r>
-            <a:r>
-              <a:rPr lang="pl-PL" sz="2000" dirty="0" err="1"/>
-              <a:t>Python</a:t>
-            </a:r>
-            <a:endParaRPr lang="pl-PL" sz="2000" dirty="0"/>
-          </a:p>
-          <a:p>
-            <a:endParaRPr lang="pl-PL" sz="2000" dirty="0"/>
-          </a:p>
-          <a:p>
-            <a:r>
-              <a:rPr lang="pl-PL" sz="2000" dirty="0"/>
-              <a:t>Najmniejsza wartość oznacza zerowe miejsce w liście czyli największy priorytet</a:t>
-            </a:r>
-          </a:p>
-          <a:p>
-            <a:endParaRPr lang="pl-PL" sz="2000" dirty="0"/>
-          </a:p>
-          <a:p>
-            <a:r>
-              <a:rPr lang="pl-PL" sz="2000" dirty="0"/>
-              <a:t>Najważniejsze operacje to </a:t>
-            </a:r>
-            <a:r>
-              <a:rPr lang="pl-PL" sz="2000" dirty="0" err="1"/>
-              <a:t>heappush</a:t>
-            </a:r>
-            <a:r>
-              <a:rPr lang="pl-PL" sz="2000" dirty="0"/>
-              <a:t> – dodanie elementu, </a:t>
-            </a:r>
-            <a:r>
-              <a:rPr lang="pl-PL" sz="2000" dirty="0" err="1"/>
-              <a:t>heappop</a:t>
-            </a:r>
-            <a:r>
-              <a:rPr lang="pl-PL" sz="2000" dirty="0"/>
-              <a:t> – usunięcie elementu, </a:t>
-            </a:r>
-            <a:r>
-              <a:rPr lang="pl-PL" sz="2000" dirty="0" err="1"/>
-              <a:t>priority_queue</a:t>
-            </a:r>
-            <a:r>
-              <a:rPr lang="pl-PL" sz="2000" dirty="0"/>
-              <a:t>[0] – wyświetlenie elementu z największym priorytetem</a:t>
+              <a:rPr lang="pl-PL" sz="2400" dirty="0"/>
+              <a:t>Wiele algorytmów grafowych m.in. Wyszukiwanie najkrótszej ścieżki w grafie </a:t>
+            </a:r>
+          </a:p>
+          <a:p>
+            <a:endParaRPr lang="pl-PL" sz="2400" dirty="0"/>
+          </a:p>
+          <a:p>
+            <a:r>
+              <a:rPr lang="pl-PL" sz="2400" dirty="0"/>
+              <a:t>Zarządzanie procesami, procesy o wyższym priorytecie wykonuje się pierwsze</a:t>
+            </a:r>
+          </a:p>
+          <a:p>
+            <a:endParaRPr lang="pl-PL" sz="2400" dirty="0"/>
+          </a:p>
+          <a:p>
+            <a:r>
+              <a:rPr lang="pl-PL" sz="2400" dirty="0"/>
+              <a:t>Kompresja danych i symulacja zdarzeń</a:t>
             </a:r>
           </a:p>
         </p:txBody>
@@ -7080,7 +7043,7 @@
     </p:spTree>
     <p:extLst>
       <p:ext uri="{BB962C8B-B14F-4D97-AF65-F5344CB8AC3E}">
-        <p14:creationId xmlns:p14="http://schemas.microsoft.com/office/powerpoint/2010/main" val="330959835"/>
+        <p14:creationId xmlns:p14="http://schemas.microsoft.com/office/powerpoint/2010/main" val="3246297485"/>
       </p:ext>
     </p:extLst>
   </p:cSld>
@@ -7112,7 +7075,7 @@
           <p:cNvPr id="2" name="Tytuł 1">
             <a:extLst>
               <a:ext uri="{FF2B5EF4-FFF2-40B4-BE49-F238E27FC236}">
-                <a16:creationId xmlns:a16="http://schemas.microsoft.com/office/drawing/2014/main" id="{3E889BE8-699D-A620-C860-49F96460127F}"/>
+                <a16:creationId xmlns:a16="http://schemas.microsoft.com/office/drawing/2014/main" id="{BE18F60B-220A-32BB-5E5D-08C322A470DF}"/>
               </a:ext>
             </a:extLst>
           </p:cNvPr>
@@ -7123,12 +7086,7 @@
             <p:ph type="title"/>
           </p:nvPr>
         </p:nvSpPr>
-        <p:spPr>
-          <a:xfrm>
-            <a:off x="677334" y="1089764"/>
-            <a:ext cx="8596668" cy="840636"/>
-          </a:xfrm>
-        </p:spPr>
+        <p:spPr/>
         <p:txBody>
           <a:bodyPr>
             <a:normAutofit/>
@@ -7137,7 +7095,7 @@
           <a:p>
             <a:r>
               <a:rPr lang="pl-PL" sz="4000" b="1" dirty="0"/>
-              <a:t>Algorytm Dijkstry</a:t>
+              <a:t>Kolejki priorytetowe - podsumowanie</a:t>
             </a:r>
           </a:p>
         </p:txBody>
@@ -7147,7 +7105,7 @@
           <p:cNvPr id="3" name="Symbol zastępczy zawartości 2">
             <a:extLst>
               <a:ext uri="{FF2B5EF4-FFF2-40B4-BE49-F238E27FC236}">
-                <a16:creationId xmlns:a16="http://schemas.microsoft.com/office/drawing/2014/main" id="{98C77CCA-89B1-6115-6C54-550E88236321}"/>
+                <a16:creationId xmlns:a16="http://schemas.microsoft.com/office/drawing/2014/main" id="{A204FEB9-833A-EAE1-4F61-7215940CEEDA}"/>
               </a:ext>
             </a:extLst>
           </p:cNvPr>
@@ -7166,14 +7124,63 @@
           <a:lstStyle/>
           <a:p>
             <a:r>
-              <a:rPr lang="pl-PL" sz="2400" dirty="0"/>
-              <a:t>Algorytm znajduje najkrótszą ścieżkę z wybranego wierzchołka do pozostałych wierzchołków</a:t>
-            </a:r>
-          </a:p>
-          <a:p>
-            <a:r>
-              <a:rPr lang="pl-PL" sz="2400" dirty="0"/>
-              <a:t>Iteracyjne wybieranie wierzchołka o najmniejszej znanej odległości i aktualizacja odległości do jego sąsiadów</a:t>
+              <a:rPr lang="pl-PL" sz="2000" dirty="0"/>
+              <a:t>Można szybko zaimplementować wykorzystując </a:t>
+            </a:r>
+            <a:r>
+              <a:rPr lang="pl-PL" sz="2000" dirty="0" err="1"/>
+              <a:t>heapq</a:t>
+            </a:r>
+            <a:r>
+              <a:rPr lang="pl-PL" sz="2000" dirty="0"/>
+              <a:t> w </a:t>
+            </a:r>
+            <a:r>
+              <a:rPr lang="pl-PL" sz="2000" dirty="0" err="1"/>
+              <a:t>Python</a:t>
+            </a:r>
+            <a:endParaRPr lang="pl-PL" sz="2000" dirty="0"/>
+          </a:p>
+          <a:p>
+            <a:endParaRPr lang="pl-PL" sz="2000" dirty="0"/>
+          </a:p>
+          <a:p>
+            <a:r>
+              <a:rPr lang="pl-PL" sz="2000" dirty="0"/>
+              <a:t>Najmniejsza wartość oznacza zerowe miejsce w liście czyli największy priorytet</a:t>
+            </a:r>
+          </a:p>
+          <a:p>
+            <a:endParaRPr lang="pl-PL" sz="2000" dirty="0"/>
+          </a:p>
+          <a:p>
+            <a:r>
+              <a:rPr lang="pl-PL" sz="2000" dirty="0"/>
+              <a:t>Najważniejsze operacje to </a:t>
+            </a:r>
+            <a:r>
+              <a:rPr lang="pl-PL" sz="2000" dirty="0" err="1"/>
+              <a:t>heappush</a:t>
+            </a:r>
+            <a:r>
+              <a:rPr lang="pl-PL" sz="2000" dirty="0"/>
+              <a:t> – dodanie elementu, </a:t>
+            </a:r>
+            <a:r>
+              <a:rPr lang="pl-PL" sz="2000" dirty="0" err="1"/>
+              <a:t>heappop</a:t>
+            </a:r>
+            <a:r>
+              <a:rPr lang="pl-PL" sz="2000" dirty="0"/>
+              <a:t> – usunięcie elementu, </a:t>
+            </a:r>
+            <a:r>
+              <a:rPr lang="pl-PL" sz="2000" dirty="0" err="1"/>
+              <a:t>priority_queue</a:t>
+            </a:r>
+            <a:r>
+              <a:rPr lang="pl-PL" sz="2000" dirty="0"/>
+              <a:t>[0] – wyświetlenie elementu z największym priorytetem</a:t>
             </a:r>
           </a:p>
         </p:txBody>
@@ -7181,7 +7188,7 @@
     </p:spTree>
     <p:extLst>
       <p:ext uri="{BB962C8B-B14F-4D97-AF65-F5344CB8AC3E}">
-        <p14:creationId xmlns:p14="http://schemas.microsoft.com/office/powerpoint/2010/main" val="2838802322"/>
+        <p14:creationId xmlns:p14="http://schemas.microsoft.com/office/powerpoint/2010/main" val="330959835"/>
       </p:ext>
     </p:extLst>
   </p:cSld>
@@ -7226,19 +7233,19 @@
         </p:nvSpPr>
         <p:spPr>
           <a:xfrm>
-            <a:off x="677334" y="676856"/>
-            <a:ext cx="8596668" cy="1238657"/>
+            <a:off x="677334" y="1089764"/>
+            <a:ext cx="8596668" cy="840636"/>
           </a:xfrm>
         </p:spPr>
         <p:txBody>
           <a:bodyPr>
-            <a:noAutofit/>
+            <a:normAutofit/>
           </a:bodyPr>
           <a:lstStyle/>
           <a:p>
             <a:r>
               <a:rPr lang="pl-PL" sz="4000" b="1" dirty="0"/>
-              <a:t>Algorytm Dijkstry – wykorzystanie kolejki priorytetowej</a:t>
+              <a:t>Algorytm Dijkstry</a:t>
             </a:r>
           </a:p>
         </p:txBody>
@@ -7259,12 +7266,7 @@
             <p:ph idx="1"/>
           </p:nvPr>
         </p:nvSpPr>
-        <p:spPr>
-          <a:xfrm>
-            <a:off x="677334" y="2306391"/>
-            <a:ext cx="8596668" cy="4132116"/>
-          </a:xfrm>
-        </p:spPr>
+        <p:spPr/>
         <p:txBody>
           <a:bodyPr>
             <a:normAutofit/>
@@ -7273,19 +7275,13 @@
           <a:p>
             <a:r>
               <a:rPr lang="pl-PL" sz="2400" dirty="0"/>
-              <a:t>Algorytm musi wielokrotnie wybierać wierzchołek o najmniejszej odległości</a:t>
+              <a:t>Algorytm znajduje najkrótszą ścieżkę z wybranego wierzchołka do pozostałych wierzchołków</a:t>
             </a:r>
           </a:p>
           <a:p>
             <a:r>
               <a:rPr lang="pl-PL" sz="2400" dirty="0"/>
-              <a:t>Kolejne wierzchołki w grafie są dodawane do kolejki, gdzie priorytetem jest odległość (koszt) od węzła źródłowego</a:t>
-            </a:r>
-          </a:p>
-          <a:p>
-            <a:r>
-              <a:rPr lang="pl-PL" sz="2400" dirty="0"/>
-              <a:t>Operacje z użyciem kolejki priorytetowej są szybsze niż w przypadku prostego wyszukiwania, co przyspiesza działanie algorytmu</a:t>
+              <a:t>Iteracyjne wybieranie wierzchołka o najmniejszej znanej odległości i aktualizacja odległości do jego sąsiadów</a:t>
             </a:r>
           </a:p>
         </p:txBody>
@@ -7293,7 +7289,7 @@
     </p:spTree>
     <p:extLst>
       <p:ext uri="{BB962C8B-B14F-4D97-AF65-F5344CB8AC3E}">
-        <p14:creationId xmlns:p14="http://schemas.microsoft.com/office/powerpoint/2010/main" val="3433211102"/>
+        <p14:creationId xmlns:p14="http://schemas.microsoft.com/office/powerpoint/2010/main" val="2838802322"/>
       </p:ext>
     </p:extLst>
   </p:cSld>
@@ -7438,6 +7434,118 @@
           <p:cNvPr id="2" name="Tytuł 1">
             <a:extLst>
               <a:ext uri="{FF2B5EF4-FFF2-40B4-BE49-F238E27FC236}">
+                <a16:creationId xmlns:a16="http://schemas.microsoft.com/office/drawing/2014/main" id="{3E889BE8-699D-A620-C860-49F96460127F}"/>
+              </a:ext>
+            </a:extLst>
+          </p:cNvPr>
+          <p:cNvSpPr>
+            <a:spLocks noGrp="1"/>
+          </p:cNvSpPr>
+          <p:nvPr>
+            <p:ph type="title"/>
+          </p:nvPr>
+        </p:nvSpPr>
+        <p:spPr>
+          <a:xfrm>
+            <a:off x="677334" y="676856"/>
+            <a:ext cx="8596668" cy="1238657"/>
+          </a:xfrm>
+        </p:spPr>
+        <p:txBody>
+          <a:bodyPr>
+            <a:noAutofit/>
+          </a:bodyPr>
+          <a:lstStyle/>
+          <a:p>
+            <a:r>
+              <a:rPr lang="pl-PL" sz="4000" b="1" dirty="0"/>
+              <a:t>Algorytm Dijkstry – wykorzystanie kolejki priorytetowej</a:t>
+            </a:r>
+          </a:p>
+        </p:txBody>
+      </p:sp>
+      <p:sp>
+        <p:nvSpPr>
+          <p:cNvPr id="3" name="Symbol zastępczy zawartości 2">
+            <a:extLst>
+              <a:ext uri="{FF2B5EF4-FFF2-40B4-BE49-F238E27FC236}">
+                <a16:creationId xmlns:a16="http://schemas.microsoft.com/office/drawing/2014/main" id="{98C77CCA-89B1-6115-6C54-550E88236321}"/>
+              </a:ext>
+            </a:extLst>
+          </p:cNvPr>
+          <p:cNvSpPr>
+            <a:spLocks noGrp="1"/>
+          </p:cNvSpPr>
+          <p:nvPr>
+            <p:ph idx="1"/>
+          </p:nvPr>
+        </p:nvSpPr>
+        <p:spPr>
+          <a:xfrm>
+            <a:off x="677334" y="2306391"/>
+            <a:ext cx="8596668" cy="4132116"/>
+          </a:xfrm>
+        </p:spPr>
+        <p:txBody>
+          <a:bodyPr>
+            <a:normAutofit/>
+          </a:bodyPr>
+          <a:lstStyle/>
+          <a:p>
+            <a:r>
+              <a:rPr lang="pl-PL" sz="2400" dirty="0"/>
+              <a:t>Algorytm musi wielokrotnie wybierać wierzchołek o najmniejszej odległości</a:t>
+            </a:r>
+          </a:p>
+          <a:p>
+            <a:r>
+              <a:rPr lang="pl-PL" sz="2400" dirty="0"/>
+              <a:t>Kolejne wierzchołki w grafie są dodawane do kolejki, gdzie priorytetem jest odległość (koszt) od węzła źródłowego</a:t>
+            </a:r>
+          </a:p>
+          <a:p>
+            <a:r>
+              <a:rPr lang="pl-PL" sz="2400" dirty="0"/>
+              <a:t>Operacje z użyciem kolejki priorytetowej są szybsze niż w przypadku prostego wyszukiwania, co przyspiesza działanie algorytmu</a:t>
+            </a:r>
+          </a:p>
+        </p:txBody>
+      </p:sp>
+    </p:spTree>
+    <p:extLst>
+      <p:ext uri="{BB962C8B-B14F-4D97-AF65-F5344CB8AC3E}">
+        <p14:creationId xmlns:p14="http://schemas.microsoft.com/office/powerpoint/2010/main" val="3433211102"/>
+      </p:ext>
+    </p:extLst>
+  </p:cSld>
+  <p:clrMapOvr>
+    <a:masterClrMapping/>
+  </p:clrMapOvr>
+</p:sld>
+</file>
+
+<file path=ppt/slides/slide21.xml><?xml version="1.0" encoding="utf-8"?>
+<p:sld xmlns:a="http://schemas.openxmlformats.org/drawingml/2006/main" xmlns:r="http://schemas.openxmlformats.org/officeDocument/2006/relationships" xmlns:p="http://schemas.openxmlformats.org/presentationml/2006/main">
+  <p:cSld>
+    <p:spTree>
+      <p:nvGrpSpPr>
+        <p:cNvPr id="1" name=""/>
+        <p:cNvGrpSpPr/>
+        <p:nvPr/>
+      </p:nvGrpSpPr>
+      <p:grpSpPr>
+        <a:xfrm>
+          <a:off x="0" y="0"/>
+          <a:ext cx="0" cy="0"/>
+          <a:chOff x="0" y="0"/>
+          <a:chExt cx="0" cy="0"/>
+        </a:xfrm>
+      </p:grpSpPr>
+      <p:sp>
+        <p:nvSpPr>
+          <p:cNvPr id="2" name="Tytuł 1">
+            <a:extLst>
+              <a:ext uri="{FF2B5EF4-FFF2-40B4-BE49-F238E27FC236}">
                 <a16:creationId xmlns:a16="http://schemas.microsoft.com/office/drawing/2014/main" id="{AB120225-B9A0-C590-08A7-DDE8319FB5D0}"/>
               </a:ext>
             </a:extLst>
@@ -7530,7 +7638,7 @@
             </a:r>
             <a:r>
               <a:rPr lang="pl-PL" sz="2000" dirty="0" err="1"/>
-              <a:t>CreatingGraph</a:t>
+              <a:t>Graph</a:t>
             </a:r>
             <a:r>
               <a:rPr lang="pl-PL" sz="2000" dirty="0"/>

</xml_diff>